<commit_message>
updated bistro, clarified test 3
</commit_message>
<xml_diff>
--- a/Bistro/menu.pptx
+++ b/Bistro/menu.pptx
@@ -53,7 +53,7 @@
       </p:grpSpPr>
       <p:sp>
         <p:nvSpPr>
-          <p:cNvPr id="26" name="PlaceHolder 1"/>
+          <p:cNvPr id="23" name="PlaceHolder 1"/>
           <p:cNvSpPr>
             <a:spLocks noGrp="1"/>
           </p:cNvSpPr>
@@ -64,7 +64,7 @@
         <p:spPr>
           <a:xfrm>
             <a:off x="514440" y="2840400"/>
-            <a:ext cx="5829120" cy="1959840"/>
+            <a:ext cx="5828400" cy="1959120"/>
           </a:xfrm>
           <a:prstGeom prst="rect">
             <a:avLst/>
@@ -75,18 +75,16 @@
             <a:noAutofit/>
           </a:bodyPr>
           <a:p>
-            <a:endParaRPr b="0" lang="en-US" sz="1800" spc="-1" strike="noStrike">
-              <a:solidFill>
-                <a:srgbClr val="000000"/>
-              </a:solidFill>
-              <a:latin typeface="Calibri"/>
-            </a:endParaRPr>
-          </a:p>
-        </p:txBody>
-      </p:sp>
-      <p:sp>
-        <p:nvSpPr>
-          <p:cNvPr id="27" name="PlaceHolder 2"/>
+            <a:pPr algn="ctr"/>
+            <a:endParaRPr b="0" lang="en-CA" sz="4400" spc="-1" strike="noStrike">
+              <a:latin typeface="Arial"/>
+            </a:endParaRPr>
+          </a:p>
+        </p:txBody>
+      </p:sp>
+      <p:sp>
+        <p:nvSpPr>
+          <p:cNvPr id="24" name="PlaceHolder 2"/>
           <p:cNvSpPr>
             <a:spLocks noGrp="1"/>
           </p:cNvSpPr>
@@ -97,7 +95,7 @@
         <p:spPr>
           <a:xfrm>
             <a:off x="342720" y="2139480"/>
-            <a:ext cx="6171840" cy="2529360"/>
+            <a:ext cx="6171480" cy="2529000"/>
           </a:xfrm>
           <a:prstGeom prst="rect">
             <a:avLst/>
@@ -108,18 +106,15 @@
             <a:normAutofit/>
           </a:bodyPr>
           <a:p>
-            <a:endParaRPr b="0" lang="en-US" sz="3200" spc="-1" strike="noStrike">
-              <a:solidFill>
-                <a:srgbClr val="000000"/>
-              </a:solidFill>
-              <a:latin typeface="Calibri"/>
-            </a:endParaRPr>
-          </a:p>
-        </p:txBody>
-      </p:sp>
-      <p:sp>
-        <p:nvSpPr>
-          <p:cNvPr id="28" name="PlaceHolder 3"/>
+            <a:endParaRPr b="0" lang="en-CA" sz="3200" spc="-1" strike="noStrike">
+              <a:latin typeface="Arial"/>
+            </a:endParaRPr>
+          </a:p>
+        </p:txBody>
+      </p:sp>
+      <p:sp>
+        <p:nvSpPr>
+          <p:cNvPr id="25" name="PlaceHolder 3"/>
           <p:cNvSpPr>
             <a:spLocks noGrp="1"/>
           </p:cNvSpPr>
@@ -129,8 +124,8 @@
         </p:nvSpPr>
         <p:spPr>
           <a:xfrm>
-            <a:off x="342720" y="4909680"/>
-            <a:ext cx="6171840" cy="2529360"/>
+            <a:off x="342720" y="4908960"/>
+            <a:ext cx="6171480" cy="2529000"/>
           </a:xfrm>
           <a:prstGeom prst="rect">
             <a:avLst/>
@@ -141,11 +136,8 @@
             <a:normAutofit/>
           </a:bodyPr>
           <a:p>
-            <a:endParaRPr b="0" lang="en-US" sz="3200" spc="-1" strike="noStrike">
-              <a:solidFill>
-                <a:srgbClr val="000000"/>
-              </a:solidFill>
-              <a:latin typeface="Calibri"/>
+            <a:endParaRPr b="0" lang="en-CA" sz="3200" spc="-1" strike="noStrike">
+              <a:latin typeface="Arial"/>
             </a:endParaRPr>
           </a:p>
         </p:txBody>
@@ -174,7 +166,7 @@
       </p:grpSpPr>
       <p:sp>
         <p:nvSpPr>
-          <p:cNvPr id="29" name="PlaceHolder 1"/>
+          <p:cNvPr id="26" name="PlaceHolder 1"/>
           <p:cNvSpPr>
             <a:spLocks noGrp="1"/>
           </p:cNvSpPr>
@@ -185,7 +177,7 @@
         <p:spPr>
           <a:xfrm>
             <a:off x="514440" y="2840400"/>
-            <a:ext cx="5829120" cy="1959840"/>
+            <a:ext cx="5828400" cy="1959120"/>
           </a:xfrm>
           <a:prstGeom prst="rect">
             <a:avLst/>
@@ -196,18 +188,16 @@
             <a:noAutofit/>
           </a:bodyPr>
           <a:p>
-            <a:endParaRPr b="0" lang="en-US" sz="1800" spc="-1" strike="noStrike">
-              <a:solidFill>
-                <a:srgbClr val="000000"/>
-              </a:solidFill>
-              <a:latin typeface="Calibri"/>
-            </a:endParaRPr>
-          </a:p>
-        </p:txBody>
-      </p:sp>
-      <p:sp>
-        <p:nvSpPr>
-          <p:cNvPr id="30" name="PlaceHolder 2"/>
+            <a:pPr algn="ctr"/>
+            <a:endParaRPr b="0" lang="en-CA" sz="4400" spc="-1" strike="noStrike">
+              <a:latin typeface="Arial"/>
+            </a:endParaRPr>
+          </a:p>
+        </p:txBody>
+      </p:sp>
+      <p:sp>
+        <p:nvSpPr>
+          <p:cNvPr id="27" name="PlaceHolder 2"/>
           <p:cNvSpPr>
             <a:spLocks noGrp="1"/>
           </p:cNvSpPr>
@@ -218,7 +208,7 @@
         <p:spPr>
           <a:xfrm>
             <a:off x="342720" y="2139480"/>
-            <a:ext cx="3011760" cy="2529360"/>
+            <a:ext cx="3011400" cy="2529000"/>
           </a:xfrm>
           <a:prstGeom prst="rect">
             <a:avLst/>
@@ -229,18 +219,15 @@
             <a:normAutofit/>
           </a:bodyPr>
           <a:p>
-            <a:endParaRPr b="0" lang="en-US" sz="3200" spc="-1" strike="noStrike">
-              <a:solidFill>
-                <a:srgbClr val="000000"/>
-              </a:solidFill>
-              <a:latin typeface="Calibri"/>
-            </a:endParaRPr>
-          </a:p>
-        </p:txBody>
-      </p:sp>
-      <p:sp>
-        <p:nvSpPr>
-          <p:cNvPr id="31" name="PlaceHolder 3"/>
+            <a:endParaRPr b="0" lang="en-CA" sz="3200" spc="-1" strike="noStrike">
+              <a:latin typeface="Arial"/>
+            </a:endParaRPr>
+          </a:p>
+        </p:txBody>
+      </p:sp>
+      <p:sp>
+        <p:nvSpPr>
+          <p:cNvPr id="28" name="PlaceHolder 3"/>
           <p:cNvSpPr>
             <a:spLocks noGrp="1"/>
           </p:cNvSpPr>
@@ -250,8 +237,8 @@
         </p:nvSpPr>
         <p:spPr>
           <a:xfrm>
-            <a:off x="3505320" y="2139480"/>
-            <a:ext cx="3011760" cy="2529360"/>
+            <a:off x="3504960" y="2139480"/>
+            <a:ext cx="3011400" cy="2529000"/>
           </a:xfrm>
           <a:prstGeom prst="rect">
             <a:avLst/>
@@ -262,18 +249,15 @@
             <a:normAutofit/>
           </a:bodyPr>
           <a:p>
-            <a:endParaRPr b="0" lang="en-US" sz="3200" spc="-1" strike="noStrike">
-              <a:solidFill>
-                <a:srgbClr val="000000"/>
-              </a:solidFill>
-              <a:latin typeface="Calibri"/>
-            </a:endParaRPr>
-          </a:p>
-        </p:txBody>
-      </p:sp>
-      <p:sp>
-        <p:nvSpPr>
-          <p:cNvPr id="32" name="PlaceHolder 4"/>
+            <a:endParaRPr b="0" lang="en-CA" sz="3200" spc="-1" strike="noStrike">
+              <a:latin typeface="Arial"/>
+            </a:endParaRPr>
+          </a:p>
+        </p:txBody>
+      </p:sp>
+      <p:sp>
+        <p:nvSpPr>
+          <p:cNvPr id="29" name="PlaceHolder 4"/>
           <p:cNvSpPr>
             <a:spLocks noGrp="1"/>
           </p:cNvSpPr>
@@ -283,8 +267,8 @@
         </p:nvSpPr>
         <p:spPr>
           <a:xfrm>
-            <a:off x="342720" y="4909680"/>
-            <a:ext cx="3011760" cy="2529360"/>
+            <a:off x="342720" y="4908960"/>
+            <a:ext cx="3011400" cy="2529000"/>
           </a:xfrm>
           <a:prstGeom prst="rect">
             <a:avLst/>
@@ -295,18 +279,15 @@
             <a:normAutofit/>
           </a:bodyPr>
           <a:p>
-            <a:endParaRPr b="0" lang="en-US" sz="3200" spc="-1" strike="noStrike">
-              <a:solidFill>
-                <a:srgbClr val="000000"/>
-              </a:solidFill>
-              <a:latin typeface="Calibri"/>
-            </a:endParaRPr>
-          </a:p>
-        </p:txBody>
-      </p:sp>
-      <p:sp>
-        <p:nvSpPr>
-          <p:cNvPr id="33" name="PlaceHolder 5"/>
+            <a:endParaRPr b="0" lang="en-CA" sz="3200" spc="-1" strike="noStrike">
+              <a:latin typeface="Arial"/>
+            </a:endParaRPr>
+          </a:p>
+        </p:txBody>
+      </p:sp>
+      <p:sp>
+        <p:nvSpPr>
+          <p:cNvPr id="30" name="PlaceHolder 5"/>
           <p:cNvSpPr>
             <a:spLocks noGrp="1"/>
           </p:cNvSpPr>
@@ -316,8 +297,8 @@
         </p:nvSpPr>
         <p:spPr>
           <a:xfrm>
-            <a:off x="3505320" y="4909680"/>
-            <a:ext cx="3011760" cy="2529360"/>
+            <a:off x="3504960" y="4908960"/>
+            <a:ext cx="3011400" cy="2529000"/>
           </a:xfrm>
           <a:prstGeom prst="rect">
             <a:avLst/>
@@ -328,11 +309,8 @@
             <a:normAutofit/>
           </a:bodyPr>
           <a:p>
-            <a:endParaRPr b="0" lang="en-US" sz="3200" spc="-1" strike="noStrike">
-              <a:solidFill>
-                <a:srgbClr val="000000"/>
-              </a:solidFill>
-              <a:latin typeface="Calibri"/>
+            <a:endParaRPr b="0" lang="en-CA" sz="3200" spc="-1" strike="noStrike">
+              <a:latin typeface="Arial"/>
             </a:endParaRPr>
           </a:p>
         </p:txBody>
@@ -361,7 +339,7 @@
       </p:grpSpPr>
       <p:sp>
         <p:nvSpPr>
-          <p:cNvPr id="34" name="PlaceHolder 1"/>
+          <p:cNvPr id="31" name="PlaceHolder 1"/>
           <p:cNvSpPr>
             <a:spLocks noGrp="1"/>
           </p:cNvSpPr>
@@ -372,7 +350,7 @@
         <p:spPr>
           <a:xfrm>
             <a:off x="514440" y="2840400"/>
-            <a:ext cx="5829120" cy="1959840"/>
+            <a:ext cx="5828400" cy="1959120"/>
           </a:xfrm>
           <a:prstGeom prst="rect">
             <a:avLst/>
@@ -383,18 +361,16 @@
             <a:noAutofit/>
           </a:bodyPr>
           <a:p>
-            <a:endParaRPr b="0" lang="en-US" sz="1800" spc="-1" strike="noStrike">
-              <a:solidFill>
-                <a:srgbClr val="000000"/>
-              </a:solidFill>
-              <a:latin typeface="Calibri"/>
-            </a:endParaRPr>
-          </a:p>
-        </p:txBody>
-      </p:sp>
-      <p:sp>
-        <p:nvSpPr>
-          <p:cNvPr id="35" name="PlaceHolder 2"/>
+            <a:pPr algn="ctr"/>
+            <a:endParaRPr b="0" lang="en-CA" sz="4400" spc="-1" strike="noStrike">
+              <a:latin typeface="Arial"/>
+            </a:endParaRPr>
+          </a:p>
+        </p:txBody>
+      </p:sp>
+      <p:sp>
+        <p:nvSpPr>
+          <p:cNvPr id="32" name="PlaceHolder 2"/>
           <p:cNvSpPr>
             <a:spLocks noGrp="1"/>
           </p:cNvSpPr>
@@ -405,7 +381,7 @@
         <p:spPr>
           <a:xfrm>
             <a:off x="342720" y="2139480"/>
-            <a:ext cx="1987200" cy="2529360"/>
+            <a:ext cx="1986840" cy="2529000"/>
           </a:xfrm>
           <a:prstGeom prst="rect">
             <a:avLst/>
@@ -416,18 +392,15 @@
             <a:normAutofit/>
           </a:bodyPr>
           <a:p>
-            <a:endParaRPr b="0" lang="en-US" sz="3200" spc="-1" strike="noStrike">
-              <a:solidFill>
-                <a:srgbClr val="000000"/>
-              </a:solidFill>
-              <a:latin typeface="Calibri"/>
-            </a:endParaRPr>
-          </a:p>
-        </p:txBody>
-      </p:sp>
-      <p:sp>
-        <p:nvSpPr>
-          <p:cNvPr id="36" name="PlaceHolder 3"/>
+            <a:endParaRPr b="0" lang="en-CA" sz="3200" spc="-1" strike="noStrike">
+              <a:latin typeface="Arial"/>
+            </a:endParaRPr>
+          </a:p>
+        </p:txBody>
+      </p:sp>
+      <p:sp>
+        <p:nvSpPr>
+          <p:cNvPr id="33" name="PlaceHolder 3"/>
           <p:cNvSpPr>
             <a:spLocks noGrp="1"/>
           </p:cNvSpPr>
@@ -437,8 +410,8 @@
         </p:nvSpPr>
         <p:spPr>
           <a:xfrm>
-            <a:off x="2429640" y="2139480"/>
-            <a:ext cx="1987200" cy="2529360"/>
+            <a:off x="2429280" y="2139480"/>
+            <a:ext cx="1986840" cy="2529000"/>
           </a:xfrm>
           <a:prstGeom prst="rect">
             <a:avLst/>
@@ -449,18 +422,15 @@
             <a:normAutofit/>
           </a:bodyPr>
           <a:p>
-            <a:endParaRPr b="0" lang="en-US" sz="3200" spc="-1" strike="noStrike">
-              <a:solidFill>
-                <a:srgbClr val="000000"/>
-              </a:solidFill>
-              <a:latin typeface="Calibri"/>
-            </a:endParaRPr>
-          </a:p>
-        </p:txBody>
-      </p:sp>
-      <p:sp>
-        <p:nvSpPr>
-          <p:cNvPr id="37" name="PlaceHolder 4"/>
+            <a:endParaRPr b="0" lang="en-CA" sz="3200" spc="-1" strike="noStrike">
+              <a:latin typeface="Arial"/>
+            </a:endParaRPr>
+          </a:p>
+        </p:txBody>
+      </p:sp>
+      <p:sp>
+        <p:nvSpPr>
+          <p:cNvPr id="34" name="PlaceHolder 4"/>
           <p:cNvSpPr>
             <a:spLocks noGrp="1"/>
           </p:cNvSpPr>
@@ -470,8 +440,8 @@
         </p:nvSpPr>
         <p:spPr>
           <a:xfrm>
-            <a:off x="4516560" y="2139480"/>
-            <a:ext cx="1987200" cy="2529360"/>
+            <a:off x="4515840" y="2139480"/>
+            <a:ext cx="1986840" cy="2529000"/>
           </a:xfrm>
           <a:prstGeom prst="rect">
             <a:avLst/>
@@ -482,18 +452,15 @@
             <a:normAutofit/>
           </a:bodyPr>
           <a:p>
-            <a:endParaRPr b="0" lang="en-US" sz="3200" spc="-1" strike="noStrike">
-              <a:solidFill>
-                <a:srgbClr val="000000"/>
-              </a:solidFill>
-              <a:latin typeface="Calibri"/>
-            </a:endParaRPr>
-          </a:p>
-        </p:txBody>
-      </p:sp>
-      <p:sp>
-        <p:nvSpPr>
-          <p:cNvPr id="38" name="PlaceHolder 5"/>
+            <a:endParaRPr b="0" lang="en-CA" sz="3200" spc="-1" strike="noStrike">
+              <a:latin typeface="Arial"/>
+            </a:endParaRPr>
+          </a:p>
+        </p:txBody>
+      </p:sp>
+      <p:sp>
+        <p:nvSpPr>
+          <p:cNvPr id="35" name="PlaceHolder 5"/>
           <p:cNvSpPr>
             <a:spLocks noGrp="1"/>
           </p:cNvSpPr>
@@ -503,8 +470,8 @@
         </p:nvSpPr>
         <p:spPr>
           <a:xfrm>
-            <a:off x="342720" y="4909680"/>
-            <a:ext cx="1987200" cy="2529360"/>
+            <a:off x="342720" y="4908960"/>
+            <a:ext cx="1986840" cy="2529000"/>
           </a:xfrm>
           <a:prstGeom prst="rect">
             <a:avLst/>
@@ -515,18 +482,15 @@
             <a:normAutofit/>
           </a:bodyPr>
           <a:p>
-            <a:endParaRPr b="0" lang="en-US" sz="3200" spc="-1" strike="noStrike">
-              <a:solidFill>
-                <a:srgbClr val="000000"/>
-              </a:solidFill>
-              <a:latin typeface="Calibri"/>
-            </a:endParaRPr>
-          </a:p>
-        </p:txBody>
-      </p:sp>
-      <p:sp>
-        <p:nvSpPr>
-          <p:cNvPr id="39" name="PlaceHolder 6"/>
+            <a:endParaRPr b="0" lang="en-CA" sz="3200" spc="-1" strike="noStrike">
+              <a:latin typeface="Arial"/>
+            </a:endParaRPr>
+          </a:p>
+        </p:txBody>
+      </p:sp>
+      <p:sp>
+        <p:nvSpPr>
+          <p:cNvPr id="36" name="PlaceHolder 6"/>
           <p:cNvSpPr>
             <a:spLocks noGrp="1"/>
           </p:cNvSpPr>
@@ -536,8 +500,8 @@
         </p:nvSpPr>
         <p:spPr>
           <a:xfrm>
-            <a:off x="2429640" y="4909680"/>
-            <a:ext cx="1987200" cy="2529360"/>
+            <a:off x="2429280" y="4908960"/>
+            <a:ext cx="1986840" cy="2529000"/>
           </a:xfrm>
           <a:prstGeom prst="rect">
             <a:avLst/>
@@ -548,18 +512,15 @@
             <a:normAutofit/>
           </a:bodyPr>
           <a:p>
-            <a:endParaRPr b="0" lang="en-US" sz="3200" spc="-1" strike="noStrike">
-              <a:solidFill>
-                <a:srgbClr val="000000"/>
-              </a:solidFill>
-              <a:latin typeface="Calibri"/>
-            </a:endParaRPr>
-          </a:p>
-        </p:txBody>
-      </p:sp>
-      <p:sp>
-        <p:nvSpPr>
-          <p:cNvPr id="40" name="PlaceHolder 7"/>
+            <a:endParaRPr b="0" lang="en-CA" sz="3200" spc="-1" strike="noStrike">
+              <a:latin typeface="Arial"/>
+            </a:endParaRPr>
+          </a:p>
+        </p:txBody>
+      </p:sp>
+      <p:sp>
+        <p:nvSpPr>
+          <p:cNvPr id="37" name="PlaceHolder 7"/>
           <p:cNvSpPr>
             <a:spLocks noGrp="1"/>
           </p:cNvSpPr>
@@ -569,8 +530,8 @@
         </p:nvSpPr>
         <p:spPr>
           <a:xfrm>
-            <a:off x="4516560" y="4909680"/>
-            <a:ext cx="1987200" cy="2529360"/>
+            <a:off x="4515840" y="4908960"/>
+            <a:ext cx="1986840" cy="2529000"/>
           </a:xfrm>
           <a:prstGeom prst="rect">
             <a:avLst/>
@@ -581,11 +542,8 @@
             <a:normAutofit/>
           </a:bodyPr>
           <a:p>
-            <a:endParaRPr b="0" lang="en-US" sz="3200" spc="-1" strike="noStrike">
-              <a:solidFill>
-                <a:srgbClr val="000000"/>
-              </a:solidFill>
-              <a:latin typeface="Calibri"/>
+            <a:endParaRPr b="0" lang="en-CA" sz="3200" spc="-1" strike="noStrike">
+              <a:latin typeface="Arial"/>
             </a:endParaRPr>
           </a:p>
         </p:txBody>
@@ -614,7 +572,7 @@
       </p:grpSpPr>
       <p:sp>
         <p:nvSpPr>
-          <p:cNvPr id="5" name="PlaceHolder 1"/>
+          <p:cNvPr id="2" name="PlaceHolder 1"/>
           <p:cNvSpPr>
             <a:spLocks noGrp="1"/>
           </p:cNvSpPr>
@@ -625,7 +583,7 @@
         <p:spPr>
           <a:xfrm>
             <a:off x="514440" y="2840400"/>
-            <a:ext cx="5829120" cy="1959840"/>
+            <a:ext cx="5828400" cy="1959120"/>
           </a:xfrm>
           <a:prstGeom prst="rect">
             <a:avLst/>
@@ -636,18 +594,16 @@
             <a:noAutofit/>
           </a:bodyPr>
           <a:p>
-            <a:endParaRPr b="0" lang="en-US" sz="1800" spc="-1" strike="noStrike">
-              <a:solidFill>
-                <a:srgbClr val="000000"/>
-              </a:solidFill>
-              <a:latin typeface="Calibri"/>
-            </a:endParaRPr>
-          </a:p>
-        </p:txBody>
-      </p:sp>
-      <p:sp>
-        <p:nvSpPr>
-          <p:cNvPr id="6" name="PlaceHolder 2"/>
+            <a:pPr algn="ctr"/>
+            <a:endParaRPr b="0" lang="en-CA" sz="4400" spc="-1" strike="noStrike">
+              <a:latin typeface="Arial"/>
+            </a:endParaRPr>
+          </a:p>
+        </p:txBody>
+      </p:sp>
+      <p:sp>
+        <p:nvSpPr>
+          <p:cNvPr id="3" name="PlaceHolder 2"/>
           <p:cNvSpPr>
             <a:spLocks noGrp="1"/>
           </p:cNvSpPr>
@@ -658,7 +614,7 @@
         <p:spPr>
           <a:xfrm>
             <a:off x="342720" y="2139480"/>
-            <a:ext cx="6171840" cy="5302800"/>
+            <a:ext cx="6171480" cy="5302440"/>
           </a:xfrm>
           <a:prstGeom prst="rect">
             <a:avLst/>
@@ -700,7 +656,7 @@
       </p:grpSpPr>
       <p:sp>
         <p:nvSpPr>
-          <p:cNvPr id="7" name="PlaceHolder 1"/>
+          <p:cNvPr id="4" name="PlaceHolder 1"/>
           <p:cNvSpPr>
             <a:spLocks noGrp="1"/>
           </p:cNvSpPr>
@@ -711,7 +667,7 @@
         <p:spPr>
           <a:xfrm>
             <a:off x="514440" y="2840400"/>
-            <a:ext cx="5829120" cy="1959840"/>
+            <a:ext cx="5828400" cy="1959120"/>
           </a:xfrm>
           <a:prstGeom prst="rect">
             <a:avLst/>
@@ -722,18 +678,16 @@
             <a:noAutofit/>
           </a:bodyPr>
           <a:p>
-            <a:endParaRPr b="0" lang="en-US" sz="1800" spc="-1" strike="noStrike">
-              <a:solidFill>
-                <a:srgbClr val="000000"/>
-              </a:solidFill>
-              <a:latin typeface="Calibri"/>
-            </a:endParaRPr>
-          </a:p>
-        </p:txBody>
-      </p:sp>
-      <p:sp>
-        <p:nvSpPr>
-          <p:cNvPr id="8" name="PlaceHolder 2"/>
+            <a:pPr algn="ctr"/>
+            <a:endParaRPr b="0" lang="en-CA" sz="4400" spc="-1" strike="noStrike">
+              <a:latin typeface="Arial"/>
+            </a:endParaRPr>
+          </a:p>
+        </p:txBody>
+      </p:sp>
+      <p:sp>
+        <p:nvSpPr>
+          <p:cNvPr id="5" name="PlaceHolder 2"/>
           <p:cNvSpPr>
             <a:spLocks noGrp="1"/>
           </p:cNvSpPr>
@@ -744,7 +698,7 @@
         <p:spPr>
           <a:xfrm>
             <a:off x="342720" y="2139480"/>
-            <a:ext cx="6171840" cy="5302800"/>
+            <a:ext cx="6171480" cy="5302440"/>
           </a:xfrm>
           <a:prstGeom prst="rect">
             <a:avLst/>
@@ -755,11 +709,8 @@
             <a:normAutofit/>
           </a:bodyPr>
           <a:p>
-            <a:endParaRPr b="0" lang="en-US" sz="3200" spc="-1" strike="noStrike">
-              <a:solidFill>
-                <a:srgbClr val="000000"/>
-              </a:solidFill>
-              <a:latin typeface="Calibri"/>
+            <a:endParaRPr b="0" lang="en-CA" sz="3200" spc="-1" strike="noStrike">
+              <a:latin typeface="Arial"/>
             </a:endParaRPr>
           </a:p>
         </p:txBody>
@@ -788,7 +739,7 @@
       </p:grpSpPr>
       <p:sp>
         <p:nvSpPr>
-          <p:cNvPr id="9" name="PlaceHolder 1"/>
+          <p:cNvPr id="6" name="PlaceHolder 1"/>
           <p:cNvSpPr>
             <a:spLocks noGrp="1"/>
           </p:cNvSpPr>
@@ -799,7 +750,7 @@
         <p:spPr>
           <a:xfrm>
             <a:off x="514440" y="2840400"/>
-            <a:ext cx="5829120" cy="1959840"/>
+            <a:ext cx="5828400" cy="1959120"/>
           </a:xfrm>
           <a:prstGeom prst="rect">
             <a:avLst/>
@@ -810,18 +761,16 @@
             <a:noAutofit/>
           </a:bodyPr>
           <a:p>
-            <a:endParaRPr b="0" lang="en-US" sz="1800" spc="-1" strike="noStrike">
-              <a:solidFill>
-                <a:srgbClr val="000000"/>
-              </a:solidFill>
-              <a:latin typeface="Calibri"/>
-            </a:endParaRPr>
-          </a:p>
-        </p:txBody>
-      </p:sp>
-      <p:sp>
-        <p:nvSpPr>
-          <p:cNvPr id="10" name="PlaceHolder 2"/>
+            <a:pPr algn="ctr"/>
+            <a:endParaRPr b="0" lang="en-CA" sz="4400" spc="-1" strike="noStrike">
+              <a:latin typeface="Arial"/>
+            </a:endParaRPr>
+          </a:p>
+        </p:txBody>
+      </p:sp>
+      <p:sp>
+        <p:nvSpPr>
+          <p:cNvPr id="7" name="PlaceHolder 2"/>
           <p:cNvSpPr>
             <a:spLocks noGrp="1"/>
           </p:cNvSpPr>
@@ -832,7 +781,7 @@
         <p:spPr>
           <a:xfrm>
             <a:off x="342720" y="2139480"/>
-            <a:ext cx="3011760" cy="5302800"/>
+            <a:ext cx="3011400" cy="5302440"/>
           </a:xfrm>
           <a:prstGeom prst="rect">
             <a:avLst/>
@@ -843,18 +792,15 @@
             <a:normAutofit/>
           </a:bodyPr>
           <a:p>
-            <a:endParaRPr b="0" lang="en-US" sz="3200" spc="-1" strike="noStrike">
-              <a:solidFill>
-                <a:srgbClr val="000000"/>
-              </a:solidFill>
-              <a:latin typeface="Calibri"/>
-            </a:endParaRPr>
-          </a:p>
-        </p:txBody>
-      </p:sp>
-      <p:sp>
-        <p:nvSpPr>
-          <p:cNvPr id="11" name="PlaceHolder 3"/>
+            <a:endParaRPr b="0" lang="en-CA" sz="3200" spc="-1" strike="noStrike">
+              <a:latin typeface="Arial"/>
+            </a:endParaRPr>
+          </a:p>
+        </p:txBody>
+      </p:sp>
+      <p:sp>
+        <p:nvSpPr>
+          <p:cNvPr id="8" name="PlaceHolder 3"/>
           <p:cNvSpPr>
             <a:spLocks noGrp="1"/>
           </p:cNvSpPr>
@@ -864,8 +810,8 @@
         </p:nvSpPr>
         <p:spPr>
           <a:xfrm>
-            <a:off x="3505320" y="2139480"/>
-            <a:ext cx="3011760" cy="5302800"/>
+            <a:off x="3504960" y="2139480"/>
+            <a:ext cx="3011400" cy="5302440"/>
           </a:xfrm>
           <a:prstGeom prst="rect">
             <a:avLst/>
@@ -876,11 +822,8 @@
             <a:normAutofit/>
           </a:bodyPr>
           <a:p>
-            <a:endParaRPr b="0" lang="en-US" sz="3200" spc="-1" strike="noStrike">
-              <a:solidFill>
-                <a:srgbClr val="000000"/>
-              </a:solidFill>
-              <a:latin typeface="Calibri"/>
+            <a:endParaRPr b="0" lang="en-CA" sz="3200" spc="-1" strike="noStrike">
+              <a:latin typeface="Arial"/>
             </a:endParaRPr>
           </a:p>
         </p:txBody>
@@ -909,7 +852,7 @@
       </p:grpSpPr>
       <p:sp>
         <p:nvSpPr>
-          <p:cNvPr id="12" name="PlaceHolder 1"/>
+          <p:cNvPr id="9" name="PlaceHolder 1"/>
           <p:cNvSpPr>
             <a:spLocks noGrp="1"/>
           </p:cNvSpPr>
@@ -920,7 +863,7 @@
         <p:spPr>
           <a:xfrm>
             <a:off x="514440" y="2840400"/>
-            <a:ext cx="5829120" cy="1959840"/>
+            <a:ext cx="5828400" cy="1959120"/>
           </a:xfrm>
           <a:prstGeom prst="rect">
             <a:avLst/>
@@ -931,11 +874,9 @@
             <a:noAutofit/>
           </a:bodyPr>
           <a:p>
-            <a:endParaRPr b="0" lang="en-US" sz="1800" spc="-1" strike="noStrike">
-              <a:solidFill>
-                <a:srgbClr val="000000"/>
-              </a:solidFill>
-              <a:latin typeface="Calibri"/>
+            <a:pPr algn="ctr"/>
+            <a:endParaRPr b="0" lang="en-CA" sz="4400" spc="-1" strike="noStrike">
+              <a:latin typeface="Arial"/>
             </a:endParaRPr>
           </a:p>
         </p:txBody>
@@ -964,7 +905,7 @@
       </p:grpSpPr>
       <p:sp>
         <p:nvSpPr>
-          <p:cNvPr id="13" name="PlaceHolder 1"/>
+          <p:cNvPr id="10" name="PlaceHolder 1"/>
           <p:cNvSpPr>
             <a:spLocks noGrp="1"/>
           </p:cNvSpPr>
@@ -975,7 +916,7 @@
         <p:spPr>
           <a:xfrm>
             <a:off x="514440" y="2840400"/>
-            <a:ext cx="5829120" cy="9086040"/>
+            <a:ext cx="5828400" cy="9082440"/>
           </a:xfrm>
           <a:prstGeom prst="rect">
             <a:avLst/>
@@ -1017,7 +958,7 @@
       </p:grpSpPr>
       <p:sp>
         <p:nvSpPr>
-          <p:cNvPr id="14" name="PlaceHolder 1"/>
+          <p:cNvPr id="11" name="PlaceHolder 1"/>
           <p:cNvSpPr>
             <a:spLocks noGrp="1"/>
           </p:cNvSpPr>
@@ -1028,7 +969,7 @@
         <p:spPr>
           <a:xfrm>
             <a:off x="514440" y="2840400"/>
-            <a:ext cx="5829120" cy="1959840"/>
+            <a:ext cx="5828400" cy="1959120"/>
           </a:xfrm>
           <a:prstGeom prst="rect">
             <a:avLst/>
@@ -1039,18 +980,16 @@
             <a:noAutofit/>
           </a:bodyPr>
           <a:p>
-            <a:endParaRPr b="0" lang="en-US" sz="1800" spc="-1" strike="noStrike">
-              <a:solidFill>
-                <a:srgbClr val="000000"/>
-              </a:solidFill>
-              <a:latin typeface="Calibri"/>
-            </a:endParaRPr>
-          </a:p>
-        </p:txBody>
-      </p:sp>
-      <p:sp>
-        <p:nvSpPr>
-          <p:cNvPr id="15" name="PlaceHolder 2"/>
+            <a:pPr algn="ctr"/>
+            <a:endParaRPr b="0" lang="en-CA" sz="4400" spc="-1" strike="noStrike">
+              <a:latin typeface="Arial"/>
+            </a:endParaRPr>
+          </a:p>
+        </p:txBody>
+      </p:sp>
+      <p:sp>
+        <p:nvSpPr>
+          <p:cNvPr id="12" name="PlaceHolder 2"/>
           <p:cNvSpPr>
             <a:spLocks noGrp="1"/>
           </p:cNvSpPr>
@@ -1061,7 +1000,7 @@
         <p:spPr>
           <a:xfrm>
             <a:off x="342720" y="2139480"/>
-            <a:ext cx="3011760" cy="2529360"/>
+            <a:ext cx="3011400" cy="2529000"/>
           </a:xfrm>
           <a:prstGeom prst="rect">
             <a:avLst/>
@@ -1072,18 +1011,15 @@
             <a:normAutofit/>
           </a:bodyPr>
           <a:p>
-            <a:endParaRPr b="0" lang="en-US" sz="3200" spc="-1" strike="noStrike">
-              <a:solidFill>
-                <a:srgbClr val="000000"/>
-              </a:solidFill>
-              <a:latin typeface="Calibri"/>
-            </a:endParaRPr>
-          </a:p>
-        </p:txBody>
-      </p:sp>
-      <p:sp>
-        <p:nvSpPr>
-          <p:cNvPr id="16" name="PlaceHolder 3"/>
+            <a:endParaRPr b="0" lang="en-CA" sz="3200" spc="-1" strike="noStrike">
+              <a:latin typeface="Arial"/>
+            </a:endParaRPr>
+          </a:p>
+        </p:txBody>
+      </p:sp>
+      <p:sp>
+        <p:nvSpPr>
+          <p:cNvPr id="13" name="PlaceHolder 3"/>
           <p:cNvSpPr>
             <a:spLocks noGrp="1"/>
           </p:cNvSpPr>
@@ -1093,8 +1029,8 @@
         </p:nvSpPr>
         <p:spPr>
           <a:xfrm>
-            <a:off x="3505320" y="2139480"/>
-            <a:ext cx="3011760" cy="5302800"/>
+            <a:off x="3504960" y="2139480"/>
+            <a:ext cx="3011400" cy="5302440"/>
           </a:xfrm>
           <a:prstGeom prst="rect">
             <a:avLst/>
@@ -1105,18 +1041,15 @@
             <a:normAutofit/>
           </a:bodyPr>
           <a:p>
-            <a:endParaRPr b="0" lang="en-US" sz="3200" spc="-1" strike="noStrike">
-              <a:solidFill>
-                <a:srgbClr val="000000"/>
-              </a:solidFill>
-              <a:latin typeface="Calibri"/>
-            </a:endParaRPr>
-          </a:p>
-        </p:txBody>
-      </p:sp>
-      <p:sp>
-        <p:nvSpPr>
-          <p:cNvPr id="17" name="PlaceHolder 4"/>
+            <a:endParaRPr b="0" lang="en-CA" sz="3200" spc="-1" strike="noStrike">
+              <a:latin typeface="Arial"/>
+            </a:endParaRPr>
+          </a:p>
+        </p:txBody>
+      </p:sp>
+      <p:sp>
+        <p:nvSpPr>
+          <p:cNvPr id="14" name="PlaceHolder 4"/>
           <p:cNvSpPr>
             <a:spLocks noGrp="1"/>
           </p:cNvSpPr>
@@ -1126,8 +1059,8 @@
         </p:nvSpPr>
         <p:spPr>
           <a:xfrm>
-            <a:off x="342720" y="4909680"/>
-            <a:ext cx="3011760" cy="2529360"/>
+            <a:off x="342720" y="4908960"/>
+            <a:ext cx="3011400" cy="2529000"/>
           </a:xfrm>
           <a:prstGeom prst="rect">
             <a:avLst/>
@@ -1138,11 +1071,8 @@
             <a:normAutofit/>
           </a:bodyPr>
           <a:p>
-            <a:endParaRPr b="0" lang="en-US" sz="3200" spc="-1" strike="noStrike">
-              <a:solidFill>
-                <a:srgbClr val="000000"/>
-              </a:solidFill>
-              <a:latin typeface="Calibri"/>
+            <a:endParaRPr b="0" lang="en-CA" sz="3200" spc="-1" strike="noStrike">
+              <a:latin typeface="Arial"/>
             </a:endParaRPr>
           </a:p>
         </p:txBody>
@@ -1171,7 +1101,7 @@
       </p:grpSpPr>
       <p:sp>
         <p:nvSpPr>
-          <p:cNvPr id="18" name="PlaceHolder 1"/>
+          <p:cNvPr id="15" name="PlaceHolder 1"/>
           <p:cNvSpPr>
             <a:spLocks noGrp="1"/>
           </p:cNvSpPr>
@@ -1182,7 +1112,7 @@
         <p:spPr>
           <a:xfrm>
             <a:off x="514440" y="2840400"/>
-            <a:ext cx="5829120" cy="1959840"/>
+            <a:ext cx="5828400" cy="1959120"/>
           </a:xfrm>
           <a:prstGeom prst="rect">
             <a:avLst/>
@@ -1193,18 +1123,16 @@
             <a:noAutofit/>
           </a:bodyPr>
           <a:p>
-            <a:endParaRPr b="0" lang="en-US" sz="1800" spc="-1" strike="noStrike">
-              <a:solidFill>
-                <a:srgbClr val="000000"/>
-              </a:solidFill>
-              <a:latin typeface="Calibri"/>
-            </a:endParaRPr>
-          </a:p>
-        </p:txBody>
-      </p:sp>
-      <p:sp>
-        <p:nvSpPr>
-          <p:cNvPr id="19" name="PlaceHolder 2"/>
+            <a:pPr algn="ctr"/>
+            <a:endParaRPr b="0" lang="en-CA" sz="4400" spc="-1" strike="noStrike">
+              <a:latin typeface="Arial"/>
+            </a:endParaRPr>
+          </a:p>
+        </p:txBody>
+      </p:sp>
+      <p:sp>
+        <p:nvSpPr>
+          <p:cNvPr id="16" name="PlaceHolder 2"/>
           <p:cNvSpPr>
             <a:spLocks noGrp="1"/>
           </p:cNvSpPr>
@@ -1215,7 +1143,7 @@
         <p:spPr>
           <a:xfrm>
             <a:off x="342720" y="2139480"/>
-            <a:ext cx="3011760" cy="5302800"/>
+            <a:ext cx="3011400" cy="5302440"/>
           </a:xfrm>
           <a:prstGeom prst="rect">
             <a:avLst/>
@@ -1226,18 +1154,15 @@
             <a:normAutofit/>
           </a:bodyPr>
           <a:p>
-            <a:endParaRPr b="0" lang="en-US" sz="3200" spc="-1" strike="noStrike">
-              <a:solidFill>
-                <a:srgbClr val="000000"/>
-              </a:solidFill>
-              <a:latin typeface="Calibri"/>
-            </a:endParaRPr>
-          </a:p>
-        </p:txBody>
-      </p:sp>
-      <p:sp>
-        <p:nvSpPr>
-          <p:cNvPr id="20" name="PlaceHolder 3"/>
+            <a:endParaRPr b="0" lang="en-CA" sz="3200" spc="-1" strike="noStrike">
+              <a:latin typeface="Arial"/>
+            </a:endParaRPr>
+          </a:p>
+        </p:txBody>
+      </p:sp>
+      <p:sp>
+        <p:nvSpPr>
+          <p:cNvPr id="17" name="PlaceHolder 3"/>
           <p:cNvSpPr>
             <a:spLocks noGrp="1"/>
           </p:cNvSpPr>
@@ -1247,8 +1172,8 @@
         </p:nvSpPr>
         <p:spPr>
           <a:xfrm>
-            <a:off x="3505320" y="2139480"/>
-            <a:ext cx="3011760" cy="2529360"/>
+            <a:off x="3504960" y="2139480"/>
+            <a:ext cx="3011400" cy="2529000"/>
           </a:xfrm>
           <a:prstGeom prst="rect">
             <a:avLst/>
@@ -1259,18 +1184,15 @@
             <a:normAutofit/>
           </a:bodyPr>
           <a:p>
-            <a:endParaRPr b="0" lang="en-US" sz="3200" spc="-1" strike="noStrike">
-              <a:solidFill>
-                <a:srgbClr val="000000"/>
-              </a:solidFill>
-              <a:latin typeface="Calibri"/>
-            </a:endParaRPr>
-          </a:p>
-        </p:txBody>
-      </p:sp>
-      <p:sp>
-        <p:nvSpPr>
-          <p:cNvPr id="21" name="PlaceHolder 4"/>
+            <a:endParaRPr b="0" lang="en-CA" sz="3200" spc="-1" strike="noStrike">
+              <a:latin typeface="Arial"/>
+            </a:endParaRPr>
+          </a:p>
+        </p:txBody>
+      </p:sp>
+      <p:sp>
+        <p:nvSpPr>
+          <p:cNvPr id="18" name="PlaceHolder 4"/>
           <p:cNvSpPr>
             <a:spLocks noGrp="1"/>
           </p:cNvSpPr>
@@ -1280,8 +1202,8 @@
         </p:nvSpPr>
         <p:spPr>
           <a:xfrm>
-            <a:off x="3505320" y="4909680"/>
-            <a:ext cx="3011760" cy="2529360"/>
+            <a:off x="3504960" y="4908960"/>
+            <a:ext cx="3011400" cy="2529000"/>
           </a:xfrm>
           <a:prstGeom prst="rect">
             <a:avLst/>
@@ -1292,11 +1214,8 @@
             <a:normAutofit/>
           </a:bodyPr>
           <a:p>
-            <a:endParaRPr b="0" lang="en-US" sz="3200" spc="-1" strike="noStrike">
-              <a:solidFill>
-                <a:srgbClr val="000000"/>
-              </a:solidFill>
-              <a:latin typeface="Calibri"/>
+            <a:endParaRPr b="0" lang="en-CA" sz="3200" spc="-1" strike="noStrike">
+              <a:latin typeface="Arial"/>
             </a:endParaRPr>
           </a:p>
         </p:txBody>
@@ -1325,7 +1244,7 @@
       </p:grpSpPr>
       <p:sp>
         <p:nvSpPr>
-          <p:cNvPr id="22" name="PlaceHolder 1"/>
+          <p:cNvPr id="19" name="PlaceHolder 1"/>
           <p:cNvSpPr>
             <a:spLocks noGrp="1"/>
           </p:cNvSpPr>
@@ -1336,7 +1255,7 @@
         <p:spPr>
           <a:xfrm>
             <a:off x="514440" y="2840400"/>
-            <a:ext cx="5829120" cy="1959840"/>
+            <a:ext cx="5828400" cy="1959120"/>
           </a:xfrm>
           <a:prstGeom prst="rect">
             <a:avLst/>
@@ -1347,18 +1266,16 @@
             <a:noAutofit/>
           </a:bodyPr>
           <a:p>
-            <a:endParaRPr b="0" lang="en-US" sz="1800" spc="-1" strike="noStrike">
-              <a:solidFill>
-                <a:srgbClr val="000000"/>
-              </a:solidFill>
-              <a:latin typeface="Calibri"/>
-            </a:endParaRPr>
-          </a:p>
-        </p:txBody>
-      </p:sp>
-      <p:sp>
-        <p:nvSpPr>
-          <p:cNvPr id="23" name="PlaceHolder 2"/>
+            <a:pPr algn="ctr"/>
+            <a:endParaRPr b="0" lang="en-CA" sz="4400" spc="-1" strike="noStrike">
+              <a:latin typeface="Arial"/>
+            </a:endParaRPr>
+          </a:p>
+        </p:txBody>
+      </p:sp>
+      <p:sp>
+        <p:nvSpPr>
+          <p:cNvPr id="20" name="PlaceHolder 2"/>
           <p:cNvSpPr>
             <a:spLocks noGrp="1"/>
           </p:cNvSpPr>
@@ -1369,7 +1286,7 @@
         <p:spPr>
           <a:xfrm>
             <a:off x="342720" y="2139480"/>
-            <a:ext cx="3011760" cy="2529360"/>
+            <a:ext cx="3011400" cy="2529000"/>
           </a:xfrm>
           <a:prstGeom prst="rect">
             <a:avLst/>
@@ -1380,18 +1297,15 @@
             <a:normAutofit/>
           </a:bodyPr>
           <a:p>
-            <a:endParaRPr b="0" lang="en-US" sz="3200" spc="-1" strike="noStrike">
-              <a:solidFill>
-                <a:srgbClr val="000000"/>
-              </a:solidFill>
-              <a:latin typeface="Calibri"/>
-            </a:endParaRPr>
-          </a:p>
-        </p:txBody>
-      </p:sp>
-      <p:sp>
-        <p:nvSpPr>
-          <p:cNvPr id="24" name="PlaceHolder 3"/>
+            <a:endParaRPr b="0" lang="en-CA" sz="3200" spc="-1" strike="noStrike">
+              <a:latin typeface="Arial"/>
+            </a:endParaRPr>
+          </a:p>
+        </p:txBody>
+      </p:sp>
+      <p:sp>
+        <p:nvSpPr>
+          <p:cNvPr id="21" name="PlaceHolder 3"/>
           <p:cNvSpPr>
             <a:spLocks noGrp="1"/>
           </p:cNvSpPr>
@@ -1401,8 +1315,8 @@
         </p:nvSpPr>
         <p:spPr>
           <a:xfrm>
-            <a:off x="3505320" y="2139480"/>
-            <a:ext cx="3011760" cy="2529360"/>
+            <a:off x="3504960" y="2139480"/>
+            <a:ext cx="3011400" cy="2529000"/>
           </a:xfrm>
           <a:prstGeom prst="rect">
             <a:avLst/>
@@ -1413,18 +1327,15 @@
             <a:normAutofit/>
           </a:bodyPr>
           <a:p>
-            <a:endParaRPr b="0" lang="en-US" sz="3200" spc="-1" strike="noStrike">
-              <a:solidFill>
-                <a:srgbClr val="000000"/>
-              </a:solidFill>
-              <a:latin typeface="Calibri"/>
-            </a:endParaRPr>
-          </a:p>
-        </p:txBody>
-      </p:sp>
-      <p:sp>
-        <p:nvSpPr>
-          <p:cNvPr id="25" name="PlaceHolder 4"/>
+            <a:endParaRPr b="0" lang="en-CA" sz="3200" spc="-1" strike="noStrike">
+              <a:latin typeface="Arial"/>
+            </a:endParaRPr>
+          </a:p>
+        </p:txBody>
+      </p:sp>
+      <p:sp>
+        <p:nvSpPr>
+          <p:cNvPr id="22" name="PlaceHolder 4"/>
           <p:cNvSpPr>
             <a:spLocks noGrp="1"/>
           </p:cNvSpPr>
@@ -1434,8 +1345,8 @@
         </p:nvSpPr>
         <p:spPr>
           <a:xfrm>
-            <a:off x="342720" y="4909680"/>
-            <a:ext cx="6171840" cy="2529360"/>
+            <a:off x="342720" y="4908960"/>
+            <a:ext cx="6171480" cy="2529000"/>
           </a:xfrm>
           <a:prstGeom prst="rect">
             <a:avLst/>
@@ -1446,11 +1357,8 @@
             <a:normAutofit/>
           </a:bodyPr>
           <a:p>
-            <a:endParaRPr b="0" lang="en-US" sz="3200" spc="-1" strike="noStrike">
-              <a:solidFill>
-                <a:srgbClr val="000000"/>
-              </a:solidFill>
-              <a:latin typeface="Calibri"/>
+            <a:endParaRPr b="0" lang="en-CA" sz="3200" spc="-1" strike="noStrike">
+              <a:latin typeface="Arial"/>
             </a:endParaRPr>
           </a:p>
         </p:txBody>
@@ -1497,36 +1405,25 @@
         <p:spPr>
           <a:xfrm>
             <a:off x="514440" y="2840400"/>
-            <a:ext cx="5829120" cy="1959840"/>
-          </a:xfrm>
-          <a:prstGeom prst="rect">
-            <a:avLst/>
-          </a:prstGeom>
-        </p:spPr>
-        <p:txBody>
-          <a:bodyPr anchor="ctr">
+            <a:ext cx="5828400" cy="1959120"/>
+          </a:xfrm>
+          <a:prstGeom prst="rect">
+            <a:avLst/>
+          </a:prstGeom>
+        </p:spPr>
+        <p:txBody>
+          <a:bodyPr lIns="0" rIns="0" tIns="0" bIns="0" anchor="ctr">
             <a:noAutofit/>
           </a:bodyPr>
           <a:p>
-            <a:pPr algn="ctr">
-              <a:lnSpc>
-                <a:spcPct val="100000"/>
-              </a:lnSpc>
-            </a:pPr>
             <a:r>
-              <a:rPr b="0" lang="en-CA" sz="4400" spc="-1" strike="noStrike">
-                <a:solidFill>
-                  <a:srgbClr val="000000"/>
-                </a:solidFill>
-                <a:latin typeface="Calibri"/>
+              <a:rPr b="0" lang="en-CA" sz="1800" spc="-1" strike="noStrike">
+                <a:latin typeface="Arial"/>
               </a:rPr>
-              <a:t>Click to edit Master title style</a:t>
+              <a:t>Click to edit the title text format</a:t>
             </a:r>
-            <a:endParaRPr b="0" lang="en-US" sz="4400" spc="-1" strike="noStrike">
-              <a:solidFill>
-                <a:srgbClr val="000000"/>
-              </a:solidFill>
-              <a:latin typeface="Calibri"/>
+            <a:endParaRPr b="0" lang="en-CA" sz="1800" spc="-1" strike="noStrike">
+              <a:latin typeface="Arial"/>
             </a:endParaRPr>
           </a:p>
         </p:txBody>
@@ -1538,131 +1435,13 @@
             <a:spLocks noGrp="1"/>
           </p:cNvSpPr>
           <p:nvPr>
-            <p:ph type="dt"/>
-          </p:nvPr>
-        </p:nvSpPr>
-        <p:spPr>
-          <a:xfrm>
-            <a:off x="343080" y="8475120"/>
-            <a:ext cx="1599840" cy="486360"/>
-          </a:xfrm>
-          <a:prstGeom prst="rect">
-            <a:avLst/>
-          </a:prstGeom>
-        </p:spPr>
-        <p:txBody>
-          <a:bodyPr anchor="ctr">
-            <a:noAutofit/>
-          </a:bodyPr>
-          <a:p>
-            <a:pPr>
-              <a:lnSpc>
-                <a:spcPct val="100000"/>
-              </a:lnSpc>
-            </a:pPr>
-            <a:fld id="{66FB8377-AED9-4DFD-9C7D-93F5945BC14E}" type="datetime">
-              <a:rPr b="0" lang="en-US" sz="1200" spc="-1" strike="noStrike">
-                <a:solidFill>
-                  <a:srgbClr val="8b8b8b"/>
-                </a:solidFill>
-                <a:latin typeface="Calibri"/>
-              </a:rPr>
-              <a:t>1/4/23</a:t>
-            </a:fld>
-            <a:endParaRPr b="0" lang="en-CA" sz="1200" spc="-1" strike="noStrike">
-              <a:latin typeface="Times New Roman"/>
-            </a:endParaRPr>
-          </a:p>
-        </p:txBody>
-      </p:sp>
-      <p:sp>
-        <p:nvSpPr>
-          <p:cNvPr id="2" name="PlaceHolder 3"/>
-          <p:cNvSpPr>
-            <a:spLocks noGrp="1"/>
-          </p:cNvSpPr>
-          <p:nvPr>
-            <p:ph type="ftr"/>
-          </p:nvPr>
-        </p:nvSpPr>
-        <p:spPr>
-          <a:xfrm>
-            <a:off x="2343240" y="8475120"/>
-            <a:ext cx="2171520" cy="486360"/>
-          </a:xfrm>
-          <a:prstGeom prst="rect">
-            <a:avLst/>
-          </a:prstGeom>
-        </p:spPr>
-        <p:txBody>
-          <a:bodyPr anchor="ctr">
-            <a:noAutofit/>
-          </a:bodyPr>
-          <a:p>
-            <a:endParaRPr b="0" lang="en-CA" sz="2400" spc="-1" strike="noStrike">
-              <a:latin typeface="Times New Roman"/>
-            </a:endParaRPr>
-          </a:p>
-        </p:txBody>
-      </p:sp>
-      <p:sp>
-        <p:nvSpPr>
-          <p:cNvPr id="3" name="PlaceHolder 4"/>
-          <p:cNvSpPr>
-            <a:spLocks noGrp="1"/>
-          </p:cNvSpPr>
-          <p:nvPr>
-            <p:ph type="sldNum"/>
-          </p:nvPr>
-        </p:nvSpPr>
-        <p:spPr>
-          <a:xfrm>
-            <a:off x="4915080" y="8475120"/>
-            <a:ext cx="1599840" cy="486360"/>
-          </a:xfrm>
-          <a:prstGeom prst="rect">
-            <a:avLst/>
-          </a:prstGeom>
-        </p:spPr>
-        <p:txBody>
-          <a:bodyPr anchor="ctr">
-            <a:noAutofit/>
-          </a:bodyPr>
-          <a:p>
-            <a:pPr algn="r">
-              <a:lnSpc>
-                <a:spcPct val="100000"/>
-              </a:lnSpc>
-            </a:pPr>
-            <a:fld id="{4F105146-823D-45F5-8E64-BAB5B6B739F0}" type="slidenum">
-              <a:rPr b="0" lang="en-US" sz="1200" spc="-1" strike="noStrike">
-                <a:solidFill>
-                  <a:srgbClr val="8b8b8b"/>
-                </a:solidFill>
-                <a:latin typeface="Calibri"/>
-              </a:rPr>
-              <a:t>1</a:t>
-            </a:fld>
-            <a:endParaRPr b="0" lang="en-CA" sz="1200" spc="-1" strike="noStrike">
-              <a:latin typeface="Times New Roman"/>
-            </a:endParaRPr>
-          </a:p>
-        </p:txBody>
-      </p:sp>
-      <p:sp>
-        <p:nvSpPr>
-          <p:cNvPr id="4" name="PlaceHolder 5"/>
-          <p:cNvSpPr>
-            <a:spLocks noGrp="1"/>
-          </p:cNvSpPr>
-          <p:nvPr>
             <p:ph type="body"/>
           </p:nvPr>
         </p:nvSpPr>
         <p:spPr>
           <a:xfrm>
             <a:off x="342720" y="2139480"/>
-            <a:ext cx="6171840" cy="5302800"/>
+            <a:ext cx="6171480" cy="5302440"/>
           </a:xfrm>
           <a:prstGeom prst="rect">
             <a:avLst/>
@@ -1685,19 +1464,13 @@
               <a:buChar char=""/>
             </a:pPr>
             <a:r>
-              <a:rPr b="0" lang="en-US" sz="3200" spc="-1" strike="noStrike">
-                <a:solidFill>
-                  <a:srgbClr val="000000"/>
-                </a:solidFill>
-                <a:latin typeface="Calibri"/>
+              <a:rPr b="0" lang="en-CA" sz="1800" spc="-1" strike="noStrike">
+                <a:latin typeface="Arial"/>
               </a:rPr>
               <a:t>Click to edit the outline text format</a:t>
             </a:r>
-            <a:endParaRPr b="0" lang="en-US" sz="3200" spc="-1" strike="noStrike">
-              <a:solidFill>
-                <a:srgbClr val="000000"/>
-              </a:solidFill>
-              <a:latin typeface="Calibri"/>
+            <a:endParaRPr b="0" lang="en-CA" sz="1800" spc="-1" strike="noStrike">
+              <a:latin typeface="Arial"/>
             </a:endParaRPr>
           </a:p>
           <a:p>
@@ -1713,19 +1486,13 @@
               <a:buChar char=""/>
             </a:pPr>
             <a:r>
-              <a:rPr b="0" lang="en-US" sz="2400" spc="-1" strike="noStrike">
-                <a:solidFill>
-                  <a:srgbClr val="000000"/>
-                </a:solidFill>
-                <a:latin typeface="Calibri"/>
+              <a:rPr b="0" lang="en-CA" sz="1800" spc="-1" strike="noStrike">
+                <a:latin typeface="Arial"/>
               </a:rPr>
               <a:t>Second Outline Level</a:t>
             </a:r>
-            <a:endParaRPr b="0" lang="en-US" sz="2400" spc="-1" strike="noStrike">
-              <a:solidFill>
-                <a:srgbClr val="000000"/>
-              </a:solidFill>
-              <a:latin typeface="Calibri"/>
+            <a:endParaRPr b="0" lang="en-CA" sz="1800" spc="-1" strike="noStrike">
+              <a:latin typeface="Arial"/>
             </a:endParaRPr>
           </a:p>
           <a:p>
@@ -1741,19 +1508,13 @@
               <a:buChar char=""/>
             </a:pPr>
             <a:r>
-              <a:rPr b="0" lang="en-US" sz="2000" spc="-1" strike="noStrike">
-                <a:solidFill>
-                  <a:srgbClr val="000000"/>
-                </a:solidFill>
-                <a:latin typeface="Calibri"/>
+              <a:rPr b="0" lang="en-CA" sz="1800" spc="-1" strike="noStrike">
+                <a:latin typeface="Arial"/>
               </a:rPr>
               <a:t>Third Outline Level</a:t>
             </a:r>
-            <a:endParaRPr b="0" lang="en-US" sz="2000" spc="-1" strike="noStrike">
-              <a:solidFill>
-                <a:srgbClr val="000000"/>
-              </a:solidFill>
-              <a:latin typeface="Calibri"/>
+            <a:endParaRPr b="0" lang="en-CA" sz="1800" spc="-1" strike="noStrike">
+              <a:latin typeface="Arial"/>
             </a:endParaRPr>
           </a:p>
           <a:p>
@@ -1769,19 +1530,13 @@
               <a:buChar char=""/>
             </a:pPr>
             <a:r>
-              <a:rPr b="0" lang="en-US" sz="2000" spc="-1" strike="noStrike">
-                <a:solidFill>
-                  <a:srgbClr val="000000"/>
-                </a:solidFill>
-                <a:latin typeface="Calibri"/>
+              <a:rPr b="0" lang="en-CA" sz="1800" spc="-1" strike="noStrike">
+                <a:latin typeface="Arial"/>
               </a:rPr>
               <a:t>Fourth Outline Level</a:t>
             </a:r>
-            <a:endParaRPr b="0" lang="en-US" sz="2000" spc="-1" strike="noStrike">
-              <a:solidFill>
-                <a:srgbClr val="000000"/>
-              </a:solidFill>
-              <a:latin typeface="Calibri"/>
+            <a:endParaRPr b="0" lang="en-CA" sz="1800" spc="-1" strike="noStrike">
+              <a:latin typeface="Arial"/>
             </a:endParaRPr>
           </a:p>
           <a:p>
@@ -1797,19 +1552,13 @@
               <a:buChar char=""/>
             </a:pPr>
             <a:r>
-              <a:rPr b="0" lang="en-US" sz="2000" spc="-1" strike="noStrike">
-                <a:solidFill>
-                  <a:srgbClr val="000000"/>
-                </a:solidFill>
-                <a:latin typeface="Calibri"/>
+              <a:rPr b="0" lang="en-CA" sz="1800" spc="-1" strike="noStrike">
+                <a:latin typeface="Arial"/>
               </a:rPr>
               <a:t>Fifth Outline Level</a:t>
             </a:r>
-            <a:endParaRPr b="0" lang="en-US" sz="2000" spc="-1" strike="noStrike">
-              <a:solidFill>
-                <a:srgbClr val="000000"/>
-              </a:solidFill>
-              <a:latin typeface="Calibri"/>
+            <a:endParaRPr b="0" lang="en-CA" sz="1800" spc="-1" strike="noStrike">
+              <a:latin typeface="Arial"/>
             </a:endParaRPr>
           </a:p>
           <a:p>
@@ -1825,19 +1574,13 @@
               <a:buChar char=""/>
             </a:pPr>
             <a:r>
-              <a:rPr b="0" lang="en-US" sz="2000" spc="-1" strike="noStrike">
-                <a:solidFill>
-                  <a:srgbClr val="000000"/>
-                </a:solidFill>
-                <a:latin typeface="Calibri"/>
+              <a:rPr b="0" lang="en-CA" sz="1800" spc="-1" strike="noStrike">
+                <a:latin typeface="Arial"/>
               </a:rPr>
               <a:t>Sixth Outline Level</a:t>
             </a:r>
-            <a:endParaRPr b="0" lang="en-US" sz="2000" spc="-1" strike="noStrike">
-              <a:solidFill>
-                <a:srgbClr val="000000"/>
-              </a:solidFill>
-              <a:latin typeface="Calibri"/>
+            <a:endParaRPr b="0" lang="en-CA" sz="1800" spc="-1" strike="noStrike">
+              <a:latin typeface="Arial"/>
             </a:endParaRPr>
           </a:p>
           <a:p>
@@ -1853,19 +1596,13 @@
               <a:buChar char=""/>
             </a:pPr>
             <a:r>
-              <a:rPr b="0" lang="en-US" sz="2000" spc="-1" strike="noStrike">
-                <a:solidFill>
-                  <a:srgbClr val="000000"/>
-                </a:solidFill>
-                <a:latin typeface="Calibri"/>
+              <a:rPr b="0" lang="en-CA" sz="1800" spc="-1" strike="noStrike">
+                <a:latin typeface="Arial"/>
               </a:rPr>
               <a:t>Seventh Outline Level</a:t>
             </a:r>
-            <a:endParaRPr b="0" lang="en-US" sz="2000" spc="-1" strike="noStrike">
-              <a:solidFill>
-                <a:srgbClr val="000000"/>
-              </a:solidFill>
-              <a:latin typeface="Calibri"/>
+            <a:endParaRPr b="0" lang="en-CA" sz="1800" spc="-1" strike="noStrike">
+              <a:latin typeface="Arial"/>
             </a:endParaRPr>
           </a:p>
         </p:txBody>
@@ -1909,14 +1646,14 @@
       </p:grpSpPr>
       <p:sp>
         <p:nvSpPr>
-          <p:cNvPr id="41" name="CustomShape 1"/>
+          <p:cNvPr id="38" name="CustomShape 1"/>
           <p:cNvSpPr/>
           <p:nvPr/>
         </p:nvSpPr>
         <p:spPr>
           <a:xfrm>
             <a:off x="0" y="0"/>
-            <a:ext cx="6857640" cy="9143640"/>
+            <a:ext cx="6856920" cy="9142920"/>
           </a:xfrm>
           <a:prstGeom prst="rect">
             <a:avLst/>
@@ -1963,14 +1700,14 @@
       </p:sp>
       <p:sp>
         <p:nvSpPr>
-          <p:cNvPr id="42" name="TextShape 2"/>
-          <p:cNvSpPr txBox="1"/>
+          <p:cNvPr id="39" name="CustomShape 2"/>
+          <p:cNvSpPr/>
           <p:nvPr/>
         </p:nvSpPr>
         <p:spPr>
           <a:xfrm>
             <a:off x="514440" y="343800"/>
-            <a:ext cx="5829120" cy="502560"/>
+            <a:ext cx="5828400" cy="501840"/>
           </a:xfrm>
           <a:prstGeom prst="rect">
             <a:avLst/>
@@ -1980,8 +1717,14 @@
             <a:noFill/>
           </a:ln>
         </p:spPr>
-        <p:txBody>
-          <a:bodyPr anchor="ctr">
+        <p:style>
+          <a:lnRef idx="0"/>
+          <a:fillRef idx="0"/>
+          <a:effectRef idx="0"/>
+          <a:fontRef idx="minor"/>
+        </p:style>
+        <p:txBody>
+          <a:bodyPr lIns="90000" rIns="90000" tIns="45000" bIns="45000" anchor="ctr">
             <a:normAutofit fontScale="49000"/>
           </a:bodyPr>
           <a:p>
@@ -1996,28 +1739,26 @@
                   <a:srgbClr val="000000"/>
                 </a:solidFill>
                 <a:latin typeface="Calibri"/>
+                <a:ea typeface="DejaVu Sans"/>
               </a:rPr>
               <a:t>Bistro ‘32</a:t>
             </a:r>
-            <a:endParaRPr b="0" lang="en-US" sz="4400" spc="-1" strike="noStrike">
-              <a:solidFill>
-                <a:srgbClr val="000000"/>
-              </a:solidFill>
-              <a:latin typeface="Calibri"/>
-            </a:endParaRPr>
-          </a:p>
-        </p:txBody>
-      </p:sp>
-      <p:sp>
-        <p:nvSpPr>
-          <p:cNvPr id="43" name="CustomShape 3"/>
+            <a:endParaRPr b="0" lang="en-CA" sz="4400" spc="-1" strike="noStrike">
+              <a:latin typeface="Arial"/>
+            </a:endParaRPr>
+          </a:p>
+        </p:txBody>
+      </p:sp>
+      <p:sp>
+        <p:nvSpPr>
+          <p:cNvPr id="40" name="CustomShape 3"/>
           <p:cNvSpPr/>
           <p:nvPr/>
         </p:nvSpPr>
         <p:spPr>
           <a:xfrm>
             <a:off x="237960" y="1242360"/>
-            <a:ext cx="2210040" cy="364680"/>
+            <a:ext cx="2209320" cy="363960"/>
           </a:xfrm>
           <a:prstGeom prst="rect">
             <a:avLst/>
@@ -2049,6 +1790,7 @@
                   <a:srgbClr val="000000"/>
                 </a:solidFill>
                 <a:latin typeface="Calibri"/>
+                <a:ea typeface="DejaVu Sans"/>
               </a:rPr>
               <a:t>Appetizers</a:t>
             </a:r>
@@ -2060,14 +1802,116 @@
       </p:sp>
       <p:sp>
         <p:nvSpPr>
-          <p:cNvPr id="44" name="CustomShape 4"/>
+          <p:cNvPr id="41" name="CustomShape 4"/>
           <p:cNvSpPr/>
           <p:nvPr/>
         </p:nvSpPr>
         <p:spPr>
           <a:xfrm>
-            <a:off x="448920" y="1588680"/>
-            <a:ext cx="1387080" cy="303480"/>
+            <a:off x="243360" y="3669120"/>
+            <a:ext cx="1294920" cy="363960"/>
+          </a:xfrm>
+          <a:prstGeom prst="rect">
+            <a:avLst/>
+          </a:prstGeom>
+          <a:noFill/>
+          <a:ln>
+            <a:noFill/>
+          </a:ln>
+        </p:spPr>
+        <p:style>
+          <a:lnRef idx="0"/>
+          <a:fillRef idx="0"/>
+          <a:effectRef idx="0"/>
+          <a:fontRef idx="minor"/>
+        </p:style>
+        <p:txBody>
+          <a:bodyPr lIns="90000" rIns="90000" tIns="45000" bIns="45000">
+            <a:spAutoFit/>
+          </a:bodyPr>
+          <a:p>
+            <a:pPr>
+              <a:lnSpc>
+                <a:spcPct val="100000"/>
+              </a:lnSpc>
+            </a:pPr>
+            <a:r>
+              <a:rPr b="1" lang="en-US" sz="1800" spc="-1" strike="noStrike">
+                <a:solidFill>
+                  <a:srgbClr val="000000"/>
+                </a:solidFill>
+                <a:latin typeface="Calibri"/>
+                <a:ea typeface="DejaVu Sans"/>
+              </a:rPr>
+              <a:t>Mains</a:t>
+            </a:r>
+            <a:endParaRPr b="0" lang="en-CA" sz="1800" spc="-1" strike="noStrike">
+              <a:latin typeface="Arial"/>
+            </a:endParaRPr>
+          </a:p>
+        </p:txBody>
+      </p:sp>
+      <p:sp>
+        <p:nvSpPr>
+          <p:cNvPr id="42" name="CustomShape 5"/>
+          <p:cNvSpPr/>
+          <p:nvPr/>
+        </p:nvSpPr>
+        <p:spPr>
+          <a:xfrm>
+            <a:off x="789480" y="4330800"/>
+            <a:ext cx="4571640" cy="454680"/>
+          </a:xfrm>
+          <a:prstGeom prst="rect">
+            <a:avLst/>
+          </a:prstGeom>
+          <a:noFill/>
+          <a:ln>
+            <a:noFill/>
+          </a:ln>
+        </p:spPr>
+        <p:style>
+          <a:lnRef idx="0"/>
+          <a:fillRef idx="0"/>
+          <a:effectRef idx="0"/>
+          <a:fontRef idx="minor"/>
+        </p:style>
+        <p:txBody>
+          <a:bodyPr lIns="90000" rIns="90000" tIns="45000" bIns="45000">
+            <a:spAutoFit/>
+          </a:bodyPr>
+          <a:p>
+            <a:pPr>
+              <a:lnSpc>
+                <a:spcPct val="100000"/>
+              </a:lnSpc>
+            </a:pPr>
+            <a:r>
+              <a:rPr b="0" i="1" lang="en-US" sz="1200" spc="-1" strike="noStrike">
+                <a:solidFill>
+                  <a:srgbClr val="000000"/>
+                </a:solidFill>
+                <a:latin typeface="Calibri"/>
+                <a:ea typeface="DejaVu Sans"/>
+              </a:rPr>
+              <a:t>Build a remote log server and configure Kickstart so that  every new server built sends authpriv messages to it.</a:t>
+            </a:r>
+            <a:endParaRPr b="0" lang="en-CA" sz="1200" spc="-1" strike="noStrike">
+              <a:latin typeface="Arial"/>
+            </a:endParaRPr>
+          </a:p>
+        </p:txBody>
+      </p:sp>
+      <p:sp>
+        <p:nvSpPr>
+          <p:cNvPr id="43" name="CustomShape 6"/>
+          <p:cNvSpPr/>
+          <p:nvPr/>
+        </p:nvSpPr>
+        <p:spPr>
+          <a:xfrm>
+            <a:off x="5992920" y="4099680"/>
+            <a:ext cx="380880" cy="302760"/>
           </a:xfrm>
           <a:prstGeom prst="rect">
             <a:avLst/>
@@ -2099,256 +1943,7 @@
                   <a:srgbClr val="000000"/>
                 </a:solidFill>
                 <a:latin typeface="Calibri"/>
-              </a:rPr>
-              <a:t>Singleton</a:t>
-            </a:r>
-            <a:endParaRPr b="0" lang="en-CA" sz="1400" spc="-1" strike="noStrike">
-              <a:latin typeface="Arial"/>
-            </a:endParaRPr>
-          </a:p>
-        </p:txBody>
-      </p:sp>
-      <p:sp>
-        <p:nvSpPr>
-          <p:cNvPr id="45" name="CustomShape 5"/>
-          <p:cNvSpPr/>
-          <p:nvPr/>
-        </p:nvSpPr>
-        <p:spPr>
-          <a:xfrm>
-            <a:off x="697680" y="1872000"/>
-            <a:ext cx="4572360" cy="637200"/>
-          </a:xfrm>
-          <a:prstGeom prst="rect">
-            <a:avLst/>
-          </a:prstGeom>
-          <a:noFill/>
-          <a:ln>
-            <a:noFill/>
-          </a:ln>
-        </p:spPr>
-        <p:style>
-          <a:lnRef idx="0"/>
-          <a:fillRef idx="0"/>
-          <a:effectRef idx="0"/>
-          <a:fontRef idx="minor"/>
-        </p:style>
-        <p:txBody>
-          <a:bodyPr lIns="90000" rIns="90000" tIns="45000" bIns="45000">
-            <a:spAutoFit/>
-          </a:bodyPr>
-          <a:p>
-            <a:pPr>
-              <a:lnSpc>
-                <a:spcPct val="100000"/>
-              </a:lnSpc>
-            </a:pPr>
-            <a:r>
-              <a:rPr b="0" i="1" lang="en-US" sz="1200" spc="-1" strike="noStrike">
-                <a:solidFill>
-                  <a:srgbClr val="000000"/>
-                </a:solidFill>
-                <a:latin typeface="Calibri"/>
-              </a:rPr>
-              <a:t>The rsync command you used in lab 8 is great, time to make it better.  Use a shell script to ensure that only one copy runs at a time. </a:t>
-            </a:r>
-            <a:endParaRPr b="0" lang="en-CA" sz="1200" spc="-1" strike="noStrike">
-              <a:latin typeface="Arial"/>
-            </a:endParaRPr>
-          </a:p>
-        </p:txBody>
-      </p:sp>
-      <p:sp>
-        <p:nvSpPr>
-          <p:cNvPr id="46" name="CustomShape 6"/>
-          <p:cNvSpPr/>
-          <p:nvPr/>
-        </p:nvSpPr>
-        <p:spPr>
-          <a:xfrm>
-            <a:off x="5961600" y="1571400"/>
-            <a:ext cx="381600" cy="303480"/>
-          </a:xfrm>
-          <a:prstGeom prst="rect">
-            <a:avLst/>
-          </a:prstGeom>
-          <a:noFill/>
-          <a:ln>
-            <a:noFill/>
-          </a:ln>
-        </p:spPr>
-        <p:style>
-          <a:lnRef idx="0"/>
-          <a:fillRef idx="0"/>
-          <a:effectRef idx="0"/>
-          <a:fontRef idx="minor"/>
-        </p:style>
-        <p:txBody>
-          <a:bodyPr lIns="90000" rIns="90000" tIns="45000" bIns="45000">
-            <a:spAutoFit/>
-          </a:bodyPr>
-          <a:p>
-            <a:pPr>
-              <a:lnSpc>
-                <a:spcPct val="100000"/>
-              </a:lnSpc>
-            </a:pPr>
-            <a:r>
-              <a:rPr b="0" lang="en-US" sz="1400" spc="-1" strike="noStrike">
-                <a:solidFill>
-                  <a:srgbClr val="000000"/>
-                </a:solidFill>
-                <a:latin typeface="Calibri"/>
-              </a:rPr>
-              <a:t>2</a:t>
-            </a:r>
-            <a:endParaRPr b="0" lang="en-CA" sz="1400" spc="-1" strike="noStrike">
-              <a:latin typeface="Arial"/>
-            </a:endParaRPr>
-          </a:p>
-        </p:txBody>
-      </p:sp>
-      <p:sp>
-        <p:nvSpPr>
-          <p:cNvPr id="47" name="CustomShape 7"/>
-          <p:cNvSpPr/>
-          <p:nvPr/>
-        </p:nvSpPr>
-        <p:spPr>
-          <a:xfrm>
-            <a:off x="243360" y="3669120"/>
-            <a:ext cx="1295640" cy="364680"/>
-          </a:xfrm>
-          <a:prstGeom prst="rect">
-            <a:avLst/>
-          </a:prstGeom>
-          <a:noFill/>
-          <a:ln>
-            <a:noFill/>
-          </a:ln>
-        </p:spPr>
-        <p:style>
-          <a:lnRef idx="0"/>
-          <a:fillRef idx="0"/>
-          <a:effectRef idx="0"/>
-          <a:fontRef idx="minor"/>
-        </p:style>
-        <p:txBody>
-          <a:bodyPr lIns="90000" rIns="90000" tIns="45000" bIns="45000">
-            <a:spAutoFit/>
-          </a:bodyPr>
-          <a:p>
-            <a:pPr>
-              <a:lnSpc>
-                <a:spcPct val="100000"/>
-              </a:lnSpc>
-            </a:pPr>
-            <a:r>
-              <a:rPr b="1" lang="en-US" sz="1800" spc="-1" strike="noStrike">
-                <a:solidFill>
-                  <a:srgbClr val="000000"/>
-                </a:solidFill>
-                <a:latin typeface="Calibri"/>
-              </a:rPr>
-              <a:t>Mains</a:t>
-            </a:r>
-            <a:endParaRPr b="0" lang="en-CA" sz="1800" spc="-1" strike="noStrike">
-              <a:latin typeface="Arial"/>
-            </a:endParaRPr>
-          </a:p>
-        </p:txBody>
-      </p:sp>
-      <p:sp>
-        <p:nvSpPr>
-          <p:cNvPr id="48" name="CustomShape 8"/>
-          <p:cNvSpPr/>
-          <p:nvPr/>
-        </p:nvSpPr>
-        <p:spPr>
-          <a:xfrm>
-            <a:off x="789480" y="4330800"/>
-            <a:ext cx="4572360" cy="455400"/>
-          </a:xfrm>
-          <a:prstGeom prst="rect">
-            <a:avLst/>
-          </a:prstGeom>
-          <a:noFill/>
-          <a:ln>
-            <a:noFill/>
-          </a:ln>
-        </p:spPr>
-        <p:style>
-          <a:lnRef idx="0"/>
-          <a:fillRef idx="0"/>
-          <a:effectRef idx="0"/>
-          <a:fontRef idx="minor"/>
-        </p:style>
-        <p:txBody>
-          <a:bodyPr lIns="90000" rIns="90000" tIns="45000" bIns="45000">
-            <a:spAutoFit/>
-          </a:bodyPr>
-          <a:p>
-            <a:pPr>
-              <a:lnSpc>
-                <a:spcPct val="100000"/>
-              </a:lnSpc>
-            </a:pPr>
-            <a:r>
-              <a:rPr b="0" i="1" lang="en-US" sz="1200" spc="-1" strike="noStrike">
-                <a:solidFill>
-                  <a:srgbClr val="000000"/>
-                </a:solidFill>
-                <a:latin typeface="Calibri"/>
-              </a:rPr>
-              <a:t>Build a remote log server and configure Kickstart so that  every new server built sends authpriv messages to it.</a:t>
-            </a:r>
-            <a:endParaRPr b="0" lang="en-CA" sz="1200" spc="-1" strike="noStrike">
-              <a:latin typeface="Arial"/>
-            </a:endParaRPr>
-          </a:p>
-        </p:txBody>
-      </p:sp>
-      <p:sp>
-        <p:nvSpPr>
-          <p:cNvPr id="49" name="CustomShape 9"/>
-          <p:cNvSpPr/>
-          <p:nvPr/>
-        </p:nvSpPr>
-        <p:spPr>
-          <a:xfrm>
-            <a:off x="5992920" y="4099680"/>
-            <a:ext cx="381600" cy="303480"/>
-          </a:xfrm>
-          <a:prstGeom prst="rect">
-            <a:avLst/>
-          </a:prstGeom>
-          <a:noFill/>
-          <a:ln>
-            <a:noFill/>
-          </a:ln>
-        </p:spPr>
-        <p:style>
-          <a:lnRef idx="0"/>
-          <a:fillRef idx="0"/>
-          <a:effectRef idx="0"/>
-          <a:fontRef idx="minor"/>
-        </p:style>
-        <p:txBody>
-          <a:bodyPr lIns="90000" rIns="90000" tIns="45000" bIns="45000">
-            <a:spAutoFit/>
-          </a:bodyPr>
-          <a:p>
-            <a:pPr>
-              <a:lnSpc>
-                <a:spcPct val="100000"/>
-              </a:lnSpc>
-            </a:pPr>
-            <a:r>
-              <a:rPr b="0" lang="en-US" sz="1400" spc="-1" strike="noStrike">
-                <a:solidFill>
-                  <a:srgbClr val="000000"/>
-                </a:solidFill>
-                <a:latin typeface="Calibri"/>
+                <a:ea typeface="DejaVu Sans"/>
               </a:rPr>
               <a:t>4</a:t>
             </a:r>
@@ -2360,7 +1955,7 @@
       </p:sp>
       <p:sp>
         <p:nvSpPr>
-          <p:cNvPr id="50" name="Line 10"/>
+          <p:cNvPr id="44" name="Line 7"/>
           <p:cNvSpPr/>
           <p:nvPr/>
         </p:nvSpPr>
@@ -2391,14 +1986,14 @@
       </p:sp>
       <p:sp>
         <p:nvSpPr>
-          <p:cNvPr id="51" name="CustomShape 11"/>
+          <p:cNvPr id="45" name="CustomShape 8"/>
           <p:cNvSpPr/>
           <p:nvPr/>
         </p:nvSpPr>
         <p:spPr>
           <a:xfrm>
             <a:off x="484920" y="4099680"/>
-            <a:ext cx="2334600" cy="303480"/>
+            <a:ext cx="2333880" cy="302760"/>
           </a:xfrm>
           <a:prstGeom prst="rect">
             <a:avLst/>
@@ -2430,6 +2025,7 @@
                   <a:srgbClr val="000000"/>
                 </a:solidFill>
                 <a:latin typeface="Calibri"/>
+                <a:ea typeface="DejaVu Sans"/>
               </a:rPr>
               <a:t>Log Server</a:t>
             </a:r>
@@ -2441,14 +2037,14 @@
       </p:sp>
       <p:sp>
         <p:nvSpPr>
-          <p:cNvPr id="52" name="CustomShape 12"/>
+          <p:cNvPr id="46" name="CustomShape 9"/>
           <p:cNvSpPr/>
           <p:nvPr/>
         </p:nvSpPr>
         <p:spPr>
           <a:xfrm>
             <a:off x="395640" y="6370200"/>
-            <a:ext cx="1295640" cy="364680"/>
+            <a:ext cx="1294920" cy="363960"/>
           </a:xfrm>
           <a:prstGeom prst="rect">
             <a:avLst/>
@@ -2480,6 +2076,7 @@
                   <a:srgbClr val="000000"/>
                 </a:solidFill>
                 <a:latin typeface="Calibri"/>
+                <a:ea typeface="DejaVu Sans"/>
               </a:rPr>
               <a:t>Desert</a:t>
             </a:r>
@@ -2491,14 +2088,14 @@
       </p:sp>
       <p:sp>
         <p:nvSpPr>
-          <p:cNvPr id="53" name="CustomShape 13"/>
+          <p:cNvPr id="47" name="CustomShape 10"/>
           <p:cNvSpPr/>
           <p:nvPr/>
         </p:nvSpPr>
         <p:spPr>
           <a:xfrm>
             <a:off x="942120" y="7031880"/>
-            <a:ext cx="4572360" cy="454680"/>
+            <a:ext cx="4571640" cy="454680"/>
           </a:xfrm>
           <a:prstGeom prst="rect">
             <a:avLst/>
@@ -2530,6 +2127,7 @@
                   <a:srgbClr val="000000"/>
                 </a:solidFill>
                 <a:latin typeface="Calibri"/>
+                <a:ea typeface="DejaVu Sans"/>
               </a:rPr>
               <a:t>Got a cool project Unix project?  The better it is, the more you earn. </a:t>
             </a:r>
@@ -2541,14 +2139,14 @@
       </p:sp>
       <p:sp>
         <p:nvSpPr>
-          <p:cNvPr id="54" name="CustomShape 14"/>
+          <p:cNvPr id="48" name="CustomShape 11"/>
           <p:cNvSpPr/>
           <p:nvPr/>
         </p:nvSpPr>
         <p:spPr>
           <a:xfrm>
             <a:off x="5660280" y="6800760"/>
-            <a:ext cx="1114200" cy="515880"/>
+            <a:ext cx="1113480" cy="515880"/>
           </a:xfrm>
           <a:prstGeom prst="rect">
             <a:avLst/>
@@ -2580,6 +2178,7 @@
                   <a:srgbClr val="000000"/>
                 </a:solidFill>
                 <a:latin typeface="Calibri"/>
+                <a:ea typeface="DejaVu Sans"/>
               </a:rPr>
               <a:t>market price</a:t>
             </a:r>
@@ -2591,7 +2190,7 @@
       </p:sp>
       <p:sp>
         <p:nvSpPr>
-          <p:cNvPr id="55" name="Line 15"/>
+          <p:cNvPr id="49" name="Line 12"/>
           <p:cNvSpPr/>
           <p:nvPr/>
         </p:nvSpPr>
@@ -2622,14 +2221,14 @@
       </p:sp>
       <p:sp>
         <p:nvSpPr>
-          <p:cNvPr id="56" name="CustomShape 16"/>
+          <p:cNvPr id="50" name="CustomShape 13"/>
           <p:cNvSpPr/>
           <p:nvPr/>
         </p:nvSpPr>
         <p:spPr>
           <a:xfrm>
             <a:off x="637200" y="6800760"/>
-            <a:ext cx="2334600" cy="303480"/>
+            <a:ext cx="2333880" cy="302760"/>
           </a:xfrm>
           <a:prstGeom prst="rect">
             <a:avLst/>
@@ -2661,6 +2260,7 @@
                   <a:srgbClr val="000000"/>
                 </a:solidFill>
                 <a:latin typeface="Calibri"/>
+                <a:ea typeface="DejaVu Sans"/>
               </a:rPr>
               <a:t>Catch of the day</a:t>
             </a:r>
@@ -2672,14 +2272,14 @@
       </p:sp>
       <p:sp>
         <p:nvSpPr>
-          <p:cNvPr id="57" name="CustomShape 17"/>
+          <p:cNvPr id="51" name="CustomShape 14"/>
           <p:cNvSpPr/>
           <p:nvPr/>
         </p:nvSpPr>
         <p:spPr>
           <a:xfrm>
             <a:off x="864360" y="5155920"/>
-            <a:ext cx="4572360" cy="455400"/>
+            <a:ext cx="4571640" cy="454680"/>
           </a:xfrm>
           <a:prstGeom prst="rect">
             <a:avLst/>
@@ -2711,6 +2311,7 @@
                   <a:srgbClr val="000000"/>
                 </a:solidFill>
                 <a:latin typeface="Calibri"/>
+                <a:ea typeface="DejaVu Sans"/>
               </a:rPr>
               <a:t>Your instructor will supply a Unix VM, on which Alice has an account.  Determine Alice’s password.</a:t>
             </a:r>
@@ -2722,14 +2323,14 @@
       </p:sp>
       <p:sp>
         <p:nvSpPr>
-          <p:cNvPr id="58" name="CustomShape 18"/>
+          <p:cNvPr id="52" name="CustomShape 15"/>
           <p:cNvSpPr/>
           <p:nvPr/>
         </p:nvSpPr>
         <p:spPr>
           <a:xfrm>
             <a:off x="6024600" y="4924800"/>
-            <a:ext cx="381600" cy="303480"/>
+            <a:ext cx="380880" cy="302760"/>
           </a:xfrm>
           <a:prstGeom prst="rect">
             <a:avLst/>
@@ -2761,6 +2362,7 @@
                   <a:srgbClr val="000000"/>
                 </a:solidFill>
                 <a:latin typeface="Calibri"/>
+                <a:ea typeface="DejaVu Sans"/>
               </a:rPr>
               <a:t>5</a:t>
             </a:r>
@@ -2772,14 +2374,14 @@
       </p:sp>
       <p:sp>
         <p:nvSpPr>
-          <p:cNvPr id="59" name="CustomShape 19"/>
+          <p:cNvPr id="53" name="CustomShape 16"/>
           <p:cNvSpPr/>
           <p:nvPr/>
         </p:nvSpPr>
         <p:spPr>
           <a:xfrm>
             <a:off x="558000" y="4924800"/>
-            <a:ext cx="2334600" cy="303480"/>
+            <a:ext cx="2333880" cy="302760"/>
           </a:xfrm>
           <a:prstGeom prst="rect">
             <a:avLst/>
@@ -2811,6 +2413,7 @@
                   <a:srgbClr val="000000"/>
                 </a:solidFill>
                 <a:latin typeface="Calibri"/>
+                <a:ea typeface="DejaVu Sans"/>
               </a:rPr>
               <a:t>White Hat</a:t>
             </a:r>
@@ -2822,7 +2425,7 @@
       </p:sp>
       <p:sp>
         <p:nvSpPr>
-          <p:cNvPr id="60" name="Line 20"/>
+          <p:cNvPr id="54" name="Line 17"/>
           <p:cNvSpPr/>
           <p:nvPr/>
         </p:nvSpPr>
@@ -2853,7 +2456,7 @@
       </p:sp>
       <p:sp>
         <p:nvSpPr>
-          <p:cNvPr id="61" name="Line 21"/>
+          <p:cNvPr id="55" name="Line 18"/>
           <p:cNvSpPr/>
           <p:nvPr/>
         </p:nvSpPr>
@@ -2884,14 +2487,14 @@
       </p:sp>
       <p:sp>
         <p:nvSpPr>
-          <p:cNvPr id="62" name="CustomShape 22"/>
+          <p:cNvPr id="56" name="CustomShape 19"/>
           <p:cNvSpPr/>
           <p:nvPr/>
         </p:nvSpPr>
         <p:spPr>
           <a:xfrm>
             <a:off x="243360" y="8090640"/>
-            <a:ext cx="6441120" cy="272880"/>
+            <a:ext cx="6440400" cy="272160"/>
           </a:xfrm>
           <a:prstGeom prst="rect">
             <a:avLst/>
@@ -2923,6 +2526,7 @@
                   <a:srgbClr val="000000"/>
                 </a:solidFill>
                 <a:latin typeface="Calibri"/>
+                <a:ea typeface="DejaVu Sans"/>
               </a:rPr>
               <a:t>Max 5 bonus marks per student</a:t>
             </a:r>
@@ -2934,14 +2538,14 @@
       </p:sp>
       <p:sp>
         <p:nvSpPr>
-          <p:cNvPr id="63" name="CustomShape 23"/>
+          <p:cNvPr id="57" name="CustomShape 20"/>
           <p:cNvSpPr/>
           <p:nvPr/>
         </p:nvSpPr>
         <p:spPr>
           <a:xfrm>
             <a:off x="520920" y="2524680"/>
-            <a:ext cx="1387080" cy="303480"/>
+            <a:ext cx="1386360" cy="302760"/>
           </a:xfrm>
           <a:prstGeom prst="rect">
             <a:avLst/>
@@ -2973,6 +2577,7 @@
                   <a:srgbClr val="000000"/>
                 </a:solidFill>
                 <a:latin typeface="Calibri"/>
+                <a:ea typeface="DejaVu Sans"/>
               </a:rPr>
               <a:t>Track /etc</a:t>
             </a:r>
@@ -2984,14 +2589,14 @@
       </p:sp>
       <p:sp>
         <p:nvSpPr>
-          <p:cNvPr id="64" name="CustomShape 24"/>
+          <p:cNvPr id="58" name="CustomShape 21"/>
           <p:cNvSpPr/>
           <p:nvPr/>
         </p:nvSpPr>
         <p:spPr>
           <a:xfrm>
             <a:off x="697680" y="2736000"/>
-            <a:ext cx="4572360" cy="454680"/>
+            <a:ext cx="4571640" cy="454680"/>
           </a:xfrm>
           <a:prstGeom prst="rect">
             <a:avLst/>
@@ -3023,6 +2628,7 @@
                   <a:srgbClr val="000000"/>
                 </a:solidFill>
                 <a:latin typeface="Calibri"/>
+                <a:ea typeface="DejaVu Sans"/>
               </a:rPr>
               <a:t>Create a GIT repo for /etc then write a cron job to commit changes once a day.</a:t>
             </a:r>
@@ -3034,14 +2640,14 @@
       </p:sp>
       <p:sp>
         <p:nvSpPr>
-          <p:cNvPr id="65" name="CustomShape 25"/>
+          <p:cNvPr id="59" name="CustomShape 22"/>
           <p:cNvSpPr/>
           <p:nvPr/>
         </p:nvSpPr>
         <p:spPr>
           <a:xfrm>
             <a:off x="5961600" y="2723400"/>
-            <a:ext cx="381600" cy="303480"/>
+            <a:ext cx="380880" cy="302760"/>
           </a:xfrm>
           <a:prstGeom prst="rect">
             <a:avLst/>
@@ -3073,6 +2679,160 @@
                   <a:srgbClr val="000000"/>
                 </a:solidFill>
                 <a:latin typeface="Calibri"/>
+                <a:ea typeface="DejaVu Sans"/>
+              </a:rPr>
+              <a:t>1</a:t>
+            </a:r>
+            <a:endParaRPr b="0" lang="en-CA" sz="1400" spc="-1" strike="noStrike">
+              <a:latin typeface="Arial"/>
+            </a:endParaRPr>
+          </a:p>
+        </p:txBody>
+      </p:sp>
+      <p:sp>
+        <p:nvSpPr>
+          <p:cNvPr id="60" name="CustomShape 23"/>
+          <p:cNvSpPr/>
+          <p:nvPr/>
+        </p:nvSpPr>
+        <p:spPr>
+          <a:xfrm>
+            <a:off x="520920" y="1732680"/>
+            <a:ext cx="1710720" cy="303120"/>
+          </a:xfrm>
+          <a:prstGeom prst="rect">
+            <a:avLst/>
+          </a:prstGeom>
+          <a:noFill/>
+          <a:ln>
+            <a:noFill/>
+          </a:ln>
+        </p:spPr>
+        <p:style>
+          <a:lnRef idx="0"/>
+          <a:fillRef idx="0"/>
+          <a:effectRef idx="0"/>
+          <a:fontRef idx="minor"/>
+        </p:style>
+        <p:txBody>
+          <a:bodyPr lIns="90000" rIns="90000" tIns="45000" bIns="45000">
+            <a:spAutoFit/>
+          </a:bodyPr>
+          <a:p>
+            <a:pPr>
+              <a:lnSpc>
+                <a:spcPct val="100000"/>
+              </a:lnSpc>
+            </a:pPr>
+            <a:r>
+              <a:rPr b="0" lang="en-US" sz="1400" spc="-1" strike="noStrike">
+                <a:solidFill>
+                  <a:srgbClr val="000000"/>
+                </a:solidFill>
+                <a:latin typeface="Calibri"/>
+                <a:ea typeface="DejaVu Sans"/>
+              </a:rPr>
+              <a:t>Discover rsync</a:t>
+            </a:r>
+            <a:endParaRPr b="0" lang="en-CA" sz="1400" spc="-1" strike="noStrike">
+              <a:latin typeface="Arial"/>
+            </a:endParaRPr>
+          </a:p>
+        </p:txBody>
+      </p:sp>
+      <p:sp>
+        <p:nvSpPr>
+          <p:cNvPr id="61" name="CustomShape 24"/>
+          <p:cNvSpPr/>
+          <p:nvPr/>
+        </p:nvSpPr>
+        <p:spPr>
+          <a:xfrm>
+            <a:off x="697680" y="2016000"/>
+            <a:ext cx="4773960" cy="455040"/>
+          </a:xfrm>
+          <a:prstGeom prst="rect">
+            <a:avLst/>
+          </a:prstGeom>
+          <a:noFill/>
+          <a:ln>
+            <a:noFill/>
+          </a:ln>
+        </p:spPr>
+        <p:style>
+          <a:lnRef idx="0"/>
+          <a:fillRef idx="0"/>
+          <a:effectRef idx="0"/>
+          <a:fontRef idx="minor"/>
+        </p:style>
+        <p:txBody>
+          <a:bodyPr lIns="90000" rIns="90000" tIns="45000" bIns="45000">
+            <a:spAutoFit/>
+          </a:bodyPr>
+          <a:p>
+            <a:pPr>
+              <a:lnSpc>
+                <a:spcPct val="100000"/>
+              </a:lnSpc>
+            </a:pPr>
+            <a:r>
+              <a:rPr b="0" i="1" lang="en-US" sz="1200" spc="-1" strike="noStrike">
+                <a:solidFill>
+                  <a:srgbClr val="000000"/>
+                </a:solidFill>
+                <a:latin typeface="Calibri"/>
+                <a:ea typeface="DejaVu Sans"/>
+              </a:rPr>
+              <a:t>rsync is often a better choice than scp.  Write an rsync command to backup a directory to a remote server.</a:t>
+            </a:r>
+            <a:endParaRPr b="0" lang="en-CA" sz="1200" spc="-1" strike="noStrike">
+              <a:latin typeface="Arial"/>
+            </a:endParaRPr>
+          </a:p>
+        </p:txBody>
+      </p:sp>
+      <p:sp>
+        <p:nvSpPr>
+          <p:cNvPr id="62" name="CustomShape 25"/>
+          <p:cNvSpPr/>
+          <p:nvPr/>
+        </p:nvSpPr>
+        <p:spPr>
+          <a:xfrm>
+            <a:off x="5961600" y="2075400"/>
+            <a:ext cx="380880" cy="302760"/>
+          </a:xfrm>
+          <a:prstGeom prst="rect">
+            <a:avLst/>
+          </a:prstGeom>
+          <a:noFill/>
+          <a:ln>
+            <a:noFill/>
+          </a:ln>
+        </p:spPr>
+        <p:style>
+          <a:lnRef idx="0"/>
+          <a:fillRef idx="0"/>
+          <a:effectRef idx="0"/>
+          <a:fontRef idx="minor"/>
+        </p:style>
+        <p:txBody>
+          <a:bodyPr lIns="90000" rIns="90000" tIns="45000" bIns="45000">
+            <a:spAutoFit/>
+          </a:bodyPr>
+          <a:p>
+            <a:pPr>
+              <a:lnSpc>
+                <a:spcPct val="100000"/>
+              </a:lnSpc>
+            </a:pPr>
+            <a:r>
+              <a:rPr b="0" lang="en-US" sz="1400" spc="-1" strike="noStrike">
+                <a:solidFill>
+                  <a:srgbClr val="000000"/>
+                </a:solidFill>
+                <a:latin typeface="Calibri"/>
+                <a:ea typeface="DejaVu Sans"/>
               </a:rPr>
               <a:t>2</a:t>
             </a:r>

</xml_diff>